<commit_message>
acpt: add scenario for XY Chart.replace_data()
</commit_message>
<xml_diff>
--- a/features/steps/test_files/cht-replace-data.pptx
+++ b/features/steps/test_files/cht-replace-data.pptx
@@ -10,6 +10,7 @@
     <p:sldId id="258" r:id="rId4"/>
     <p:sldId id="259" r:id="rId5"/>
     <p:sldId id="260" r:id="rId6"/>
+    <p:sldId id="261" r:id="rId7"/>
   </p:sldIdLst>
   <p:sldSz cx="9144000" cy="6858000" type="screen4x3"/>
   <p:notesSz cx="6858000" cy="9144000"/>
@@ -231,11 +232,11 @@
           <c:showBubbleSize val="0"/>
         </c:dLbls>
         <c:gapWidth val="150"/>
-        <c:axId val="2020938776"/>
-        <c:axId val="2144407544"/>
+        <c:axId val="2056080376"/>
+        <c:axId val="2056083352"/>
       </c:barChart>
       <c:catAx>
-        <c:axId val="2020938776"/>
+        <c:axId val="2056080376"/>
         <c:scaling>
           <c:orientation val="minMax"/>
         </c:scaling>
@@ -244,7 +245,7 @@
         <c:majorTickMark val="out"/>
         <c:minorTickMark val="none"/>
         <c:tickLblPos val="nextTo"/>
-        <c:crossAx val="2144407544"/>
+        <c:crossAx val="2056083352"/>
         <c:crosses val="autoZero"/>
         <c:auto val="1"/>
         <c:lblAlgn val="ctr"/>
@@ -252,7 +253,7 @@
         <c:noMultiLvlLbl val="0"/>
       </c:catAx>
       <c:valAx>
-        <c:axId val="2144407544"/>
+        <c:axId val="2056083352"/>
         <c:scaling>
           <c:orientation val="minMax"/>
         </c:scaling>
@@ -263,7 +264,7 @@
         <c:majorTickMark val="out"/>
         <c:minorTickMark val="none"/>
         <c:tickLblPos val="nextTo"/>
-        <c:crossAx val="2020938776"/>
+        <c:crossAx val="2056080376"/>
         <c:crosses val="autoZero"/>
         <c:crossBetween val="between"/>
       </c:valAx>
@@ -414,11 +415,11 @@
         </c:dLbls>
         <c:gapWidth val="150"/>
         <c:overlap val="100"/>
-        <c:axId val="-2108843624"/>
-        <c:axId val="-2109139384"/>
+        <c:axId val="2087221096"/>
+        <c:axId val="2087224072"/>
       </c:barChart>
       <c:catAx>
-        <c:axId val="-2108843624"/>
+        <c:axId val="2087221096"/>
         <c:scaling>
           <c:orientation val="minMax"/>
         </c:scaling>
@@ -427,7 +428,7 @@
         <c:majorTickMark val="out"/>
         <c:minorTickMark val="none"/>
         <c:tickLblPos val="nextTo"/>
-        <c:crossAx val="-2109139384"/>
+        <c:crossAx val="2087224072"/>
         <c:crosses val="autoZero"/>
         <c:auto val="1"/>
         <c:lblAlgn val="ctr"/>
@@ -435,7 +436,7 @@
         <c:noMultiLvlLbl val="0"/>
       </c:catAx>
       <c:valAx>
-        <c:axId val="-2109139384"/>
+        <c:axId val="2087224072"/>
         <c:scaling>
           <c:orientation val="minMax"/>
         </c:scaling>
@@ -446,7 +447,7 @@
         <c:majorTickMark val="out"/>
         <c:minorTickMark val="none"/>
         <c:tickLblPos val="nextTo"/>
-        <c:crossAx val="-2108843624"/>
+        <c:crossAx val="2087221096"/>
         <c:crosses val="autoZero"/>
         <c:crossBetween val="between"/>
       </c:valAx>
@@ -596,11 +597,11 @@
           <c:showBubbleSize val="0"/>
         </c:dLbls>
         <c:gapWidth val="150"/>
-        <c:axId val="2020959064"/>
-        <c:axId val="2020925768"/>
+        <c:axId val="2087277624"/>
+        <c:axId val="2087280600"/>
       </c:barChart>
       <c:catAx>
-        <c:axId val="2020959064"/>
+        <c:axId val="2087277624"/>
         <c:scaling>
           <c:orientation val="minMax"/>
         </c:scaling>
@@ -609,7 +610,7 @@
         <c:majorTickMark val="out"/>
         <c:minorTickMark val="none"/>
         <c:tickLblPos val="nextTo"/>
-        <c:crossAx val="2020925768"/>
+        <c:crossAx val="2087280600"/>
         <c:crosses val="autoZero"/>
         <c:auto val="1"/>
         <c:lblAlgn val="ctr"/>
@@ -617,7 +618,7 @@
         <c:noMultiLvlLbl val="0"/>
       </c:catAx>
       <c:valAx>
-        <c:axId val="2020925768"/>
+        <c:axId val="2087280600"/>
         <c:scaling>
           <c:orientation val="minMax"/>
         </c:scaling>
@@ -628,7 +629,7 @@
         <c:majorTickMark val="out"/>
         <c:minorTickMark val="none"/>
         <c:tickLblPos val="nextTo"/>
-        <c:crossAx val="2020959064"/>
+        <c:crossAx val="2087277624"/>
         <c:crosses val="autoZero"/>
         <c:crossBetween val="between"/>
       </c:valAx>
@@ -868,11 +869,11 @@
         </c:dLbls>
         <c:marker val="1"/>
         <c:smooth val="0"/>
-        <c:axId val="-2111329448"/>
-        <c:axId val="-2111249336"/>
+        <c:axId val="2087548312"/>
+        <c:axId val="2087551288"/>
       </c:lineChart>
       <c:catAx>
-        <c:axId val="-2111329448"/>
+        <c:axId val="2087548312"/>
         <c:scaling>
           <c:orientation val="minMax"/>
         </c:scaling>
@@ -881,7 +882,7 @@
         <c:majorTickMark val="out"/>
         <c:minorTickMark val="none"/>
         <c:tickLblPos val="nextTo"/>
-        <c:crossAx val="-2111249336"/>
+        <c:crossAx val="2087551288"/>
         <c:crosses val="autoZero"/>
         <c:auto val="1"/>
         <c:lblAlgn val="ctr"/>
@@ -889,7 +890,7 @@
         <c:noMultiLvlLbl val="0"/>
       </c:catAx>
       <c:valAx>
-        <c:axId val="-2111249336"/>
+        <c:axId val="2087551288"/>
         <c:scaling>
           <c:orientation val="minMax"/>
         </c:scaling>
@@ -900,7 +901,7 @@
         <c:majorTickMark val="out"/>
         <c:minorTickMark val="none"/>
         <c:tickLblPos val="nextTo"/>
-        <c:crossAx val="-2111329448"/>
+        <c:crossAx val="2087548312"/>
         <c:crosses val="autoZero"/>
         <c:crossBetween val="between"/>
       </c:valAx>
@@ -1014,6 +1015,208 @@
         </c:dLbls>
         <c:firstSliceAng val="0"/>
       </c:pieChart>
+    </c:plotArea>
+    <c:legend>
+      <c:legendPos val="r"/>
+      <c:layout/>
+      <c:overlay val="0"/>
+    </c:legend>
+    <c:plotVisOnly val="1"/>
+    <c:dispBlanksAs val="gap"/>
+    <c:showDLblsOverMax val="0"/>
+  </c:chart>
+  <c:txPr>
+    <a:bodyPr/>
+    <a:lstStyle/>
+    <a:p>
+      <a:pPr>
+        <a:defRPr sz="1800"/>
+      </a:pPr>
+      <a:endParaRPr lang="en-US"/>
+    </a:p>
+  </c:txPr>
+  <c:externalData r:id="rId1">
+    <c:autoUpdate val="0"/>
+  </c:externalData>
+</c:chartSpace>
+</file>
+
+<file path=ppt/charts/chart6.xml><?xml version="1.0" encoding="utf-8"?>
+<c:chartSpace xmlns:c="http://schemas.openxmlformats.org/drawingml/2006/chart" xmlns:a="http://schemas.openxmlformats.org/drawingml/2006/main" xmlns:r="http://schemas.openxmlformats.org/officeDocument/2006/relationships">
+  <c:date1904 val="0"/>
+  <c:lang val="en-US"/>
+  <c:roundedCorners val="0"/>
+  <mc:AlternateContent xmlns:mc="http://schemas.openxmlformats.org/markup-compatibility/2006">
+    <mc:Choice xmlns:c14="http://schemas.microsoft.com/office/drawing/2007/8/2/chart" Requires="c14">
+      <c14:style val="118"/>
+    </mc:Choice>
+    <mc:Fallback>
+      <c:style val="18"/>
+    </mc:Fallback>
+  </mc:AlternateContent>
+  <c:chart>
+    <c:autoTitleDeleted val="0"/>
+    <c:plotArea>
+      <c:layout/>
+      <c:scatterChart>
+        <c:scatterStyle val="lineMarker"/>
+        <c:varyColors val="0"/>
+        <c:ser>
+          <c:idx val="0"/>
+          <c:order val="0"/>
+          <c:tx>
+            <c:strRef>
+              <c:f>Sheet1!$B$1</c:f>
+              <c:strCache>
+                <c:ptCount val="1"/>
+                <c:pt idx="0">
+                  <c:v>Series 1</c:v>
+                </c:pt>
+              </c:strCache>
+            </c:strRef>
+          </c:tx>
+          <c:spPr>
+            <a:ln w="47625">
+              <a:noFill/>
+            </a:ln>
+          </c:spPr>
+          <c:xVal>
+            <c:numRef>
+              <c:f>Sheet1!$A$2:$A$4</c:f>
+              <c:numCache>
+                <c:formatCode>General</c:formatCode>
+                <c:ptCount val="3"/>
+                <c:pt idx="0">
+                  <c:v>0.7</c:v>
+                </c:pt>
+                <c:pt idx="1">
+                  <c:v>1.8</c:v>
+                </c:pt>
+                <c:pt idx="2">
+                  <c:v>2.6</c:v>
+                </c:pt>
+              </c:numCache>
+            </c:numRef>
+          </c:xVal>
+          <c:yVal>
+            <c:numRef>
+              <c:f>Sheet1!$B$2:$B$4</c:f>
+              <c:numCache>
+                <c:formatCode>General</c:formatCode>
+                <c:ptCount val="3"/>
+                <c:pt idx="0">
+                  <c:v>7.2</c:v>
+                </c:pt>
+                <c:pt idx="1">
+                  <c:v>2.3</c:v>
+                </c:pt>
+                <c:pt idx="2">
+                  <c:v>8.0</c:v>
+                </c:pt>
+              </c:numCache>
+            </c:numRef>
+          </c:yVal>
+          <c:smooth val="0"/>
+        </c:ser>
+        <c:ser>
+          <c:idx val="1"/>
+          <c:order val="1"/>
+          <c:tx>
+            <c:strRef>
+              <c:f>Sheet1!$C$1</c:f>
+              <c:strCache>
+                <c:ptCount val="1"/>
+                <c:pt idx="0">
+                  <c:v>Series 2</c:v>
+                </c:pt>
+              </c:strCache>
+            </c:strRef>
+          </c:tx>
+          <c:spPr>
+            <a:ln w="47625">
+              <a:noFill/>
+            </a:ln>
+          </c:spPr>
+          <c:xVal>
+            <c:numRef>
+              <c:f>Sheet1!$A$2:$A$4</c:f>
+              <c:numCache>
+                <c:formatCode>General</c:formatCode>
+                <c:ptCount val="3"/>
+                <c:pt idx="0">
+                  <c:v>0.7</c:v>
+                </c:pt>
+                <c:pt idx="1">
+                  <c:v>1.8</c:v>
+                </c:pt>
+                <c:pt idx="2">
+                  <c:v>2.6</c:v>
+                </c:pt>
+              </c:numCache>
+            </c:numRef>
+          </c:xVal>
+          <c:yVal>
+            <c:numRef>
+              <c:f>Sheet1!$C$2:$C$4</c:f>
+              <c:numCache>
+                <c:formatCode>General</c:formatCode>
+                <c:ptCount val="3"/>
+                <c:pt idx="0">
+                  <c:v>2.7</c:v>
+                </c:pt>
+                <c:pt idx="1">
+                  <c:v>3.2</c:v>
+                </c:pt>
+                <c:pt idx="2">
+                  <c:v>0.8</c:v>
+                </c:pt>
+              </c:numCache>
+            </c:numRef>
+          </c:yVal>
+          <c:smooth val="0"/>
+        </c:ser>
+        <c:dLbls>
+          <c:showLegendKey val="0"/>
+          <c:showVal val="0"/>
+          <c:showCatName val="0"/>
+          <c:showSerName val="0"/>
+          <c:showPercent val="0"/>
+          <c:showBubbleSize val="0"/>
+        </c:dLbls>
+        <c:axId val="2087673112"/>
+        <c:axId val="2087669944"/>
+      </c:scatterChart>
+      <c:valAx>
+        <c:axId val="2087673112"/>
+        <c:scaling>
+          <c:orientation val="minMax"/>
+        </c:scaling>
+        <c:delete val="0"/>
+        <c:axPos val="b"/>
+        <c:numFmt formatCode="General" sourceLinked="1"/>
+        <c:majorTickMark val="out"/>
+        <c:minorTickMark val="none"/>
+        <c:tickLblPos val="nextTo"/>
+        <c:crossAx val="2087669944"/>
+        <c:crosses val="autoZero"/>
+        <c:crossBetween val="midCat"/>
+      </c:valAx>
+      <c:valAx>
+        <c:axId val="2087669944"/>
+        <c:scaling>
+          <c:orientation val="minMax"/>
+        </c:scaling>
+        <c:delete val="0"/>
+        <c:axPos val="l"/>
+        <c:majorGridlines/>
+        <c:numFmt formatCode="General" sourceLinked="1"/>
+        <c:majorTickMark val="out"/>
+        <c:minorTickMark val="none"/>
+        <c:tickLblPos val="nextTo"/>
+        <c:crossAx val="2087673112"/>
+        <c:crosses val="autoZero"/>
+        <c:crossBetween val="midCat"/>
+      </c:valAx>
     </c:plotArea>
     <c:legend>
       <c:legendPos val="r"/>
@@ -1606,6 +1809,58 @@
 </p:sld>
 </file>
 
+<file path=ppt/slides/slide6.xml><?xml version="1.0" encoding="utf-8"?>
+<p:sld xmlns:a="http://schemas.openxmlformats.org/drawingml/2006/main" xmlns:r="http://schemas.openxmlformats.org/officeDocument/2006/relationships" xmlns:p="http://schemas.openxmlformats.org/presentationml/2006/main">
+  <p:cSld>
+    <p:spTree>
+      <p:nvGrpSpPr>
+        <p:cNvPr id="1" name=""/>
+        <p:cNvGrpSpPr/>
+        <p:nvPr/>
+      </p:nvGrpSpPr>
+      <p:grpSpPr>
+        <a:xfrm>
+          <a:off x="0" y="0"/>
+          <a:ext cx="0" cy="0"/>
+          <a:chOff x="0" y="0"/>
+          <a:chExt cx="0" cy="0"/>
+        </a:xfrm>
+      </p:grpSpPr>
+      <p:graphicFrame>
+        <p:nvGraphicFramePr>
+          <p:cNvPr id="2" name="Chart 1"/>
+          <p:cNvGraphicFramePr/>
+          <p:nvPr>
+            <p:extLst>
+              <p:ext uri="{D42A27DB-BD31-4B8C-83A1-F6EECF244321}">
+                <p14:modId xmlns:p14="http://schemas.microsoft.com/office/powerpoint/2010/main" val="2514714352"/>
+              </p:ext>
+            </p:extLst>
+          </p:nvPr>
+        </p:nvGraphicFramePr>
+        <p:xfrm>
+          <a:off x="1524000" y="1397000"/>
+          <a:ext cx="6096000" cy="4064000"/>
+        </p:xfrm>
+        <a:graphic>
+          <a:graphicData uri="http://schemas.openxmlformats.org/drawingml/2006/chart">
+            <c:chart xmlns:c="http://schemas.openxmlformats.org/drawingml/2006/chart" xmlns:r="http://schemas.openxmlformats.org/officeDocument/2006/relationships" r:id="rId2"/>
+          </a:graphicData>
+        </a:graphic>
+      </p:graphicFrame>
+    </p:spTree>
+    <p:extLst>
+      <p:ext uri="{BB962C8B-B14F-4D97-AF65-F5344CB8AC3E}">
+        <p14:creationId xmlns:p14="http://schemas.microsoft.com/office/powerpoint/2010/main" val="2858600240"/>
+      </p:ext>
+    </p:extLst>
+  </p:cSld>
+  <p:clrMapOvr>
+    <a:masterClrMapping/>
+  </p:clrMapOvr>
+</p:sld>
+</file>
+
 <file path=ppt/theme/theme1.xml><?xml version="1.0" encoding="utf-8"?>
 <a:theme xmlns:a="http://schemas.openxmlformats.org/drawingml/2006/main" name="Office Theme">
   <a:themeElements>

</xml_diff>

<commit_message>
acpt: add scenario for Bubble Chart.replace_data()
</commit_message>
<xml_diff>
--- a/features/steps/test_files/cht-replace-data.pptx
+++ b/features/steps/test_files/cht-replace-data.pptx
@@ -11,6 +11,7 @@
     <p:sldId id="259" r:id="rId5"/>
     <p:sldId id="260" r:id="rId6"/>
     <p:sldId id="261" r:id="rId7"/>
+    <p:sldId id="262" r:id="rId8"/>
   </p:sldIdLst>
   <p:sldSz cx="9144000" cy="6858000" type="screen4x3"/>
   <p:notesSz cx="6858000" cy="9144000"/>
@@ -232,11 +233,11 @@
           <c:showBubbleSize val="0"/>
         </c:dLbls>
         <c:gapWidth val="150"/>
-        <c:axId val="2056080376"/>
-        <c:axId val="2056083352"/>
+        <c:axId val="2055304488"/>
+        <c:axId val="2056079144"/>
       </c:barChart>
       <c:catAx>
-        <c:axId val="2056080376"/>
+        <c:axId val="2055304488"/>
         <c:scaling>
           <c:orientation val="minMax"/>
         </c:scaling>
@@ -245,7 +246,7 @@
         <c:majorTickMark val="out"/>
         <c:minorTickMark val="none"/>
         <c:tickLblPos val="nextTo"/>
-        <c:crossAx val="2056083352"/>
+        <c:crossAx val="2056079144"/>
         <c:crosses val="autoZero"/>
         <c:auto val="1"/>
         <c:lblAlgn val="ctr"/>
@@ -253,7 +254,7 @@
         <c:noMultiLvlLbl val="0"/>
       </c:catAx>
       <c:valAx>
-        <c:axId val="2056083352"/>
+        <c:axId val="2056079144"/>
         <c:scaling>
           <c:orientation val="minMax"/>
         </c:scaling>
@@ -264,7 +265,7 @@
         <c:majorTickMark val="out"/>
         <c:minorTickMark val="none"/>
         <c:tickLblPos val="nextTo"/>
-        <c:crossAx val="2056080376"/>
+        <c:crossAx val="2055304488"/>
         <c:crosses val="autoZero"/>
         <c:crossBetween val="between"/>
       </c:valAx>
@@ -415,11 +416,11 @@
         </c:dLbls>
         <c:gapWidth val="150"/>
         <c:overlap val="100"/>
-        <c:axId val="2087221096"/>
-        <c:axId val="2087224072"/>
+        <c:axId val="-2126199928"/>
+        <c:axId val="-2126196952"/>
       </c:barChart>
       <c:catAx>
-        <c:axId val="2087221096"/>
+        <c:axId val="-2126199928"/>
         <c:scaling>
           <c:orientation val="minMax"/>
         </c:scaling>
@@ -428,7 +429,7 @@
         <c:majorTickMark val="out"/>
         <c:minorTickMark val="none"/>
         <c:tickLblPos val="nextTo"/>
-        <c:crossAx val="2087224072"/>
+        <c:crossAx val="-2126196952"/>
         <c:crosses val="autoZero"/>
         <c:auto val="1"/>
         <c:lblAlgn val="ctr"/>
@@ -436,7 +437,7 @@
         <c:noMultiLvlLbl val="0"/>
       </c:catAx>
       <c:valAx>
-        <c:axId val="2087224072"/>
+        <c:axId val="-2126196952"/>
         <c:scaling>
           <c:orientation val="minMax"/>
         </c:scaling>
@@ -447,7 +448,7 @@
         <c:majorTickMark val="out"/>
         <c:minorTickMark val="none"/>
         <c:tickLblPos val="nextTo"/>
-        <c:crossAx val="2087221096"/>
+        <c:crossAx val="-2126199928"/>
         <c:crosses val="autoZero"/>
         <c:crossBetween val="between"/>
       </c:valAx>
@@ -597,11 +598,11 @@
           <c:showBubbleSize val="0"/>
         </c:dLbls>
         <c:gapWidth val="150"/>
-        <c:axId val="2087277624"/>
-        <c:axId val="2087280600"/>
+        <c:axId val="-2129785000"/>
+        <c:axId val="-2126177560"/>
       </c:barChart>
       <c:catAx>
-        <c:axId val="2087277624"/>
+        <c:axId val="-2129785000"/>
         <c:scaling>
           <c:orientation val="minMax"/>
         </c:scaling>
@@ -610,7 +611,7 @@
         <c:majorTickMark val="out"/>
         <c:minorTickMark val="none"/>
         <c:tickLblPos val="nextTo"/>
-        <c:crossAx val="2087280600"/>
+        <c:crossAx val="-2126177560"/>
         <c:crosses val="autoZero"/>
         <c:auto val="1"/>
         <c:lblAlgn val="ctr"/>
@@ -618,7 +619,7 @@
         <c:noMultiLvlLbl val="0"/>
       </c:catAx>
       <c:valAx>
-        <c:axId val="2087280600"/>
+        <c:axId val="-2126177560"/>
         <c:scaling>
           <c:orientation val="minMax"/>
         </c:scaling>
@@ -629,7 +630,7 @@
         <c:majorTickMark val="out"/>
         <c:minorTickMark val="none"/>
         <c:tickLblPos val="nextTo"/>
-        <c:crossAx val="2087277624"/>
+        <c:crossAx val="-2129785000"/>
         <c:crosses val="autoZero"/>
         <c:crossBetween val="between"/>
       </c:valAx>
@@ -869,11 +870,11 @@
         </c:dLbls>
         <c:marker val="1"/>
         <c:smooth val="0"/>
-        <c:axId val="2087548312"/>
-        <c:axId val="2087551288"/>
+        <c:axId val="-2130698472"/>
+        <c:axId val="-2129865464"/>
       </c:lineChart>
       <c:catAx>
-        <c:axId val="2087548312"/>
+        <c:axId val="-2130698472"/>
         <c:scaling>
           <c:orientation val="minMax"/>
         </c:scaling>
@@ -882,7 +883,7 @@
         <c:majorTickMark val="out"/>
         <c:minorTickMark val="none"/>
         <c:tickLblPos val="nextTo"/>
-        <c:crossAx val="2087551288"/>
+        <c:crossAx val="-2129865464"/>
         <c:crosses val="autoZero"/>
         <c:auto val="1"/>
         <c:lblAlgn val="ctr"/>
@@ -890,7 +891,7 @@
         <c:noMultiLvlLbl val="0"/>
       </c:catAx>
       <c:valAx>
-        <c:axId val="2087551288"/>
+        <c:axId val="-2129865464"/>
         <c:scaling>
           <c:orientation val="minMax"/>
         </c:scaling>
@@ -901,7 +902,7 @@
         <c:majorTickMark val="out"/>
         <c:minorTickMark val="none"/>
         <c:tickLblPos val="nextTo"/>
-        <c:crossAx val="2087548312"/>
+        <c:crossAx val="-2130698472"/>
         <c:crosses val="autoZero"/>
         <c:crossBetween val="between"/>
       </c:valAx>
@@ -1183,11 +1184,11 @@
           <c:showPercent val="0"/>
           <c:showBubbleSize val="0"/>
         </c:dLbls>
-        <c:axId val="2087673112"/>
-        <c:axId val="2087669944"/>
+        <c:axId val="-2130461704"/>
+        <c:axId val="-2130458712"/>
       </c:scatterChart>
       <c:valAx>
-        <c:axId val="2087673112"/>
+        <c:axId val="-2130461704"/>
         <c:scaling>
           <c:orientation val="minMax"/>
         </c:scaling>
@@ -1197,12 +1198,12 @@
         <c:majorTickMark val="out"/>
         <c:minorTickMark val="none"/>
         <c:tickLblPos val="nextTo"/>
-        <c:crossAx val="2087669944"/>
+        <c:crossAx val="-2130458712"/>
         <c:crosses val="autoZero"/>
         <c:crossBetween val="midCat"/>
       </c:valAx>
       <c:valAx>
-        <c:axId val="2087669944"/>
+        <c:axId val="-2130458712"/>
         <c:scaling>
           <c:orientation val="minMax"/>
         </c:scaling>
@@ -1213,7 +1214,243 @@
         <c:majorTickMark val="out"/>
         <c:minorTickMark val="none"/>
         <c:tickLblPos val="nextTo"/>
-        <c:crossAx val="2087673112"/>
+        <c:crossAx val="-2130461704"/>
+        <c:crosses val="autoZero"/>
+        <c:crossBetween val="midCat"/>
+      </c:valAx>
+    </c:plotArea>
+    <c:legend>
+      <c:legendPos val="r"/>
+      <c:layout/>
+      <c:overlay val="0"/>
+    </c:legend>
+    <c:plotVisOnly val="1"/>
+    <c:dispBlanksAs val="gap"/>
+    <c:showDLblsOverMax val="0"/>
+  </c:chart>
+  <c:txPr>
+    <a:bodyPr/>
+    <a:lstStyle/>
+    <a:p>
+      <a:pPr>
+        <a:defRPr sz="1800"/>
+      </a:pPr>
+      <a:endParaRPr lang="en-US"/>
+    </a:p>
+  </c:txPr>
+  <c:externalData r:id="rId1">
+    <c:autoUpdate val="0"/>
+  </c:externalData>
+</c:chartSpace>
+</file>
+
+<file path=ppt/charts/chart7.xml><?xml version="1.0" encoding="utf-8"?>
+<c:chartSpace xmlns:c="http://schemas.openxmlformats.org/drawingml/2006/chart" xmlns:a="http://schemas.openxmlformats.org/drawingml/2006/main" xmlns:r="http://schemas.openxmlformats.org/officeDocument/2006/relationships">
+  <c:date1904 val="0"/>
+  <c:lang val="en-US"/>
+  <c:roundedCorners val="0"/>
+  <mc:AlternateContent xmlns:mc="http://schemas.openxmlformats.org/markup-compatibility/2006">
+    <mc:Choice xmlns:c14="http://schemas.microsoft.com/office/drawing/2007/8/2/chart" Requires="c14">
+      <c14:style val="118"/>
+    </mc:Choice>
+    <mc:Fallback>
+      <c:style val="18"/>
+    </mc:Fallback>
+  </mc:AlternateContent>
+  <c:chart>
+    <c:autoTitleDeleted val="0"/>
+    <c:plotArea>
+      <c:layout/>
+      <c:bubbleChart>
+        <c:varyColors val="0"/>
+        <c:ser>
+          <c:idx val="0"/>
+          <c:order val="0"/>
+          <c:tx>
+            <c:strRef>
+              <c:f>Sheet1!$B$1</c:f>
+              <c:strCache>
+                <c:ptCount val="1"/>
+                <c:pt idx="0">
+                  <c:v>Series 1</c:v>
+                </c:pt>
+              </c:strCache>
+            </c:strRef>
+          </c:tx>
+          <c:invertIfNegative val="0"/>
+          <c:xVal>
+            <c:numRef>
+              <c:f>Sheet1!$A$2:$A$4</c:f>
+              <c:numCache>
+                <c:formatCode>General</c:formatCode>
+                <c:ptCount val="3"/>
+                <c:pt idx="0">
+                  <c:v>0.7</c:v>
+                </c:pt>
+                <c:pt idx="1">
+                  <c:v>1.8</c:v>
+                </c:pt>
+                <c:pt idx="2">
+                  <c:v>2.6</c:v>
+                </c:pt>
+              </c:numCache>
+            </c:numRef>
+          </c:xVal>
+          <c:yVal>
+            <c:numRef>
+              <c:f>Sheet1!$B$2:$B$4</c:f>
+              <c:numCache>
+                <c:formatCode>General</c:formatCode>
+                <c:ptCount val="3"/>
+                <c:pt idx="0">
+                  <c:v>2.7</c:v>
+                </c:pt>
+                <c:pt idx="1">
+                  <c:v>3.2</c:v>
+                </c:pt>
+                <c:pt idx="2">
+                  <c:v>0.8</c:v>
+                </c:pt>
+              </c:numCache>
+            </c:numRef>
+          </c:yVal>
+          <c:bubbleSize>
+            <c:numRef>
+              <c:f>Sheet1!$C$2:$C$4</c:f>
+              <c:numCache>
+                <c:formatCode>General</c:formatCode>
+                <c:ptCount val="3"/>
+                <c:pt idx="0">
+                  <c:v>10.0</c:v>
+                </c:pt>
+                <c:pt idx="1">
+                  <c:v>4.0</c:v>
+                </c:pt>
+                <c:pt idx="2">
+                  <c:v>8.0</c:v>
+                </c:pt>
+              </c:numCache>
+            </c:numRef>
+          </c:bubbleSize>
+          <c:bubble3D val="0"/>
+        </c:ser>
+        <c:ser>
+          <c:idx val="1"/>
+          <c:order val="1"/>
+          <c:tx>
+            <c:strRef>
+              <c:f>Table13[[#Headers],[Series 2]]</c:f>
+              <c:strCache>
+                <c:ptCount val="1"/>
+                <c:pt idx="0">
+                  <c:v>Series 2</c:v>
+                </c:pt>
+              </c:strCache>
+            </c:strRef>
+          </c:tx>
+          <c:spPr>
+            <a:ln w="25400">
+              <a:noFill/>
+            </a:ln>
+          </c:spPr>
+          <c:invertIfNegative val="0"/>
+          <c:xVal>
+            <c:numRef>
+              <c:f>Table13[X-Values]</c:f>
+              <c:numCache>
+                <c:formatCode>General</c:formatCode>
+                <c:ptCount val="3"/>
+                <c:pt idx="0">
+                  <c:v>7.0</c:v>
+                </c:pt>
+                <c:pt idx="1">
+                  <c:v>8.1</c:v>
+                </c:pt>
+                <c:pt idx="2">
+                  <c:v>6.2</c:v>
+                </c:pt>
+              </c:numCache>
+            </c:numRef>
+          </c:xVal>
+          <c:yVal>
+            <c:numRef>
+              <c:f>Table13[Series 2]</c:f>
+              <c:numCache>
+                <c:formatCode>General</c:formatCode>
+                <c:ptCount val="3"/>
+                <c:pt idx="0">
+                  <c:v>7.2</c:v>
+                </c:pt>
+                <c:pt idx="1">
+                  <c:v>2.3</c:v>
+                </c:pt>
+                <c:pt idx="2">
+                  <c:v>8.0</c:v>
+                </c:pt>
+              </c:numCache>
+            </c:numRef>
+          </c:yVal>
+          <c:bubbleSize>
+            <c:numRef>
+              <c:f>Table13[Size 2]</c:f>
+              <c:numCache>
+                <c:formatCode>General</c:formatCode>
+                <c:ptCount val="3"/>
+                <c:pt idx="0">
+                  <c:v>8.0</c:v>
+                </c:pt>
+                <c:pt idx="1">
+                  <c:v>10.0</c:v>
+                </c:pt>
+                <c:pt idx="2">
+                  <c:v>4.0</c:v>
+                </c:pt>
+              </c:numCache>
+            </c:numRef>
+          </c:bubbleSize>
+          <c:bubble3D val="0"/>
+        </c:ser>
+        <c:dLbls>
+          <c:showLegendKey val="0"/>
+          <c:showVal val="0"/>
+          <c:showCatName val="0"/>
+          <c:showSerName val="0"/>
+          <c:showPercent val="0"/>
+          <c:showBubbleSize val="0"/>
+        </c:dLbls>
+        <c:bubbleScale val="100"/>
+        <c:showNegBubbles val="0"/>
+        <c:axId val="-2126856792"/>
+        <c:axId val="2087206568"/>
+      </c:bubbleChart>
+      <c:valAx>
+        <c:axId val="-2126856792"/>
+        <c:scaling>
+          <c:orientation val="minMax"/>
+        </c:scaling>
+        <c:delete val="0"/>
+        <c:axPos val="b"/>
+        <c:numFmt formatCode="General" sourceLinked="1"/>
+        <c:majorTickMark val="out"/>
+        <c:minorTickMark val="none"/>
+        <c:tickLblPos val="nextTo"/>
+        <c:crossAx val="2087206568"/>
+        <c:crosses val="autoZero"/>
+        <c:crossBetween val="midCat"/>
+      </c:valAx>
+      <c:valAx>
+        <c:axId val="2087206568"/>
+        <c:scaling>
+          <c:orientation val="minMax"/>
+        </c:scaling>
+        <c:delete val="0"/>
+        <c:axPos val="l"/>
+        <c:majorGridlines/>
+        <c:numFmt formatCode="General" sourceLinked="1"/>
+        <c:majorTickMark val="out"/>
+        <c:minorTickMark val="none"/>
+        <c:tickLblPos val="nextTo"/>
+        <c:crossAx val="-2126856792"/>
         <c:crosses val="autoZero"/>
         <c:crossBetween val="midCat"/>
       </c:valAx>
@@ -1861,6 +2098,58 @@
 </p:sld>
 </file>
 
+<file path=ppt/slides/slide7.xml><?xml version="1.0" encoding="utf-8"?>
+<p:sld xmlns:a="http://schemas.openxmlformats.org/drawingml/2006/main" xmlns:r="http://schemas.openxmlformats.org/officeDocument/2006/relationships" xmlns:p="http://schemas.openxmlformats.org/presentationml/2006/main">
+  <p:cSld>
+    <p:spTree>
+      <p:nvGrpSpPr>
+        <p:cNvPr id="1" name=""/>
+        <p:cNvGrpSpPr/>
+        <p:nvPr/>
+      </p:nvGrpSpPr>
+      <p:grpSpPr>
+        <a:xfrm>
+          <a:off x="0" y="0"/>
+          <a:ext cx="0" cy="0"/>
+          <a:chOff x="0" y="0"/>
+          <a:chExt cx="0" cy="0"/>
+        </a:xfrm>
+      </p:grpSpPr>
+      <p:graphicFrame>
+        <p:nvGraphicFramePr>
+          <p:cNvPr id="2" name="Chart 1"/>
+          <p:cNvGraphicFramePr/>
+          <p:nvPr>
+            <p:extLst>
+              <p:ext uri="{D42A27DB-BD31-4B8C-83A1-F6EECF244321}">
+                <p14:modId xmlns:p14="http://schemas.microsoft.com/office/powerpoint/2010/main" val="3777397926"/>
+              </p:ext>
+            </p:extLst>
+          </p:nvPr>
+        </p:nvGraphicFramePr>
+        <p:xfrm>
+          <a:off x="1524000" y="1397000"/>
+          <a:ext cx="6096000" cy="4064000"/>
+        </p:xfrm>
+        <a:graphic>
+          <a:graphicData uri="http://schemas.openxmlformats.org/drawingml/2006/chart">
+            <c:chart xmlns:c="http://schemas.openxmlformats.org/drawingml/2006/chart" xmlns:r="http://schemas.openxmlformats.org/officeDocument/2006/relationships" r:id="rId2"/>
+          </a:graphicData>
+        </a:graphic>
+      </p:graphicFrame>
+    </p:spTree>
+    <p:extLst>
+      <p:ext uri="{BB962C8B-B14F-4D97-AF65-F5344CB8AC3E}">
+        <p14:creationId xmlns:p14="http://schemas.microsoft.com/office/powerpoint/2010/main" val="4272965626"/>
+      </p:ext>
+    </p:extLst>
+  </p:cSld>
+  <p:clrMapOvr>
+    <a:masterClrMapping/>
+  </p:clrMapOvr>
+</p:sld>
+</file>
+
 <file path=ppt/theme/theme1.xml><?xml version="1.0" encoding="utf-8"?>
 <a:theme xmlns:a="http://schemas.openxmlformats.org/drawingml/2006/main" name="Office Theme">
   <a:themeElements>

</xml_diff>